<commit_message>
added all files had a read through them and added a line or two into the powerpoint
</commit_message>
<xml_diff>
--- a/Illusive Fitness.pptx
+++ b/Illusive Fitness.pptx
@@ -229,7 +229,7 @@
           <a:p>
             <a:fld id="{E7F14A8C-4BC4-4B30-9660-6A30D388AB1E}" type="datetimeFigureOut">
               <a:rPr lang="en-GB" smtClean="0"/>
-              <a:t>25/01/2020</a:t>
+              <a:t>26/01/2020</a:t>
             </a:fld>
             <a:endParaRPr lang="en-GB"/>
           </a:p>
@@ -1606,7 +1606,7 @@
           <a:p>
             <a:fld id="{EAE06D73-B70B-4306-BE7B-D5A5B0B0BF64}" type="datetimeFigureOut">
               <a:rPr lang="en-GB" smtClean="0"/>
-              <a:t>25/01/2020</a:t>
+              <a:t>26/01/2020</a:t>
             </a:fld>
             <a:endParaRPr lang="en-GB"/>
           </a:p>
@@ -1902,7 +1902,7 @@
           <a:p>
             <a:fld id="{EAE06D73-B70B-4306-BE7B-D5A5B0B0BF64}" type="datetimeFigureOut">
               <a:rPr lang="en-GB" smtClean="0"/>
-              <a:t>25/01/2020</a:t>
+              <a:t>26/01/2020</a:t>
             </a:fld>
             <a:endParaRPr lang="en-GB"/>
           </a:p>
@@ -2150,7 +2150,7 @@
           <a:p>
             <a:fld id="{EAE06D73-B70B-4306-BE7B-D5A5B0B0BF64}" type="datetimeFigureOut">
               <a:rPr lang="en-GB" smtClean="0"/>
-              <a:t>25/01/2020</a:t>
+              <a:t>26/01/2020</a:t>
             </a:fld>
             <a:endParaRPr lang="en-GB"/>
           </a:p>
@@ -2690,7 +2690,7 @@
           <a:p>
             <a:fld id="{EAE06D73-B70B-4306-BE7B-D5A5B0B0BF64}" type="datetimeFigureOut">
               <a:rPr lang="en-GB" smtClean="0"/>
-              <a:t>25/01/2020</a:t>
+              <a:t>26/01/2020</a:t>
             </a:fld>
             <a:endParaRPr lang="en-GB"/>
           </a:p>
@@ -2938,7 +2938,7 @@
           <a:p>
             <a:fld id="{EAE06D73-B70B-4306-BE7B-D5A5B0B0BF64}" type="datetimeFigureOut">
               <a:rPr lang="en-GB" smtClean="0"/>
-              <a:t>25/01/2020</a:t>
+              <a:t>26/01/2020</a:t>
             </a:fld>
             <a:endParaRPr lang="en-GB"/>
           </a:p>
@@ -3470,7 +3470,7 @@
           <a:p>
             <a:fld id="{EAE06D73-B70B-4306-BE7B-D5A5B0B0BF64}" type="datetimeFigureOut">
               <a:rPr lang="en-GB" smtClean="0"/>
-              <a:t>25/01/2020</a:t>
+              <a:t>26/01/2020</a:t>
             </a:fld>
             <a:endParaRPr lang="en-GB"/>
           </a:p>
@@ -3767,7 +3767,7 @@
           <a:p>
             <a:fld id="{EAE06D73-B70B-4306-BE7B-D5A5B0B0BF64}" type="datetimeFigureOut">
               <a:rPr lang="en-GB" smtClean="0"/>
-              <a:t>25/01/2020</a:t>
+              <a:t>26/01/2020</a:t>
             </a:fld>
             <a:endParaRPr lang="en-GB"/>
           </a:p>
@@ -3941,7 +3941,7 @@
           <a:p>
             <a:fld id="{EAE06D73-B70B-4306-BE7B-D5A5B0B0BF64}" type="datetimeFigureOut">
               <a:rPr lang="en-GB" smtClean="0"/>
-              <a:t>25/01/2020</a:t>
+              <a:t>26/01/2020</a:t>
             </a:fld>
             <a:endParaRPr lang="en-GB"/>
           </a:p>
@@ -4121,7 +4121,7 @@
           <a:p>
             <a:fld id="{EAE06D73-B70B-4306-BE7B-D5A5B0B0BF64}" type="datetimeFigureOut">
               <a:rPr lang="en-GB" smtClean="0"/>
-              <a:t>25/01/2020</a:t>
+              <a:t>26/01/2020</a:t>
             </a:fld>
             <a:endParaRPr lang="en-GB"/>
           </a:p>
@@ -4515,7 +4515,7 @@
           <a:p>
             <a:fld id="{EAE06D73-B70B-4306-BE7B-D5A5B0B0BF64}" type="datetimeFigureOut">
               <a:rPr lang="en-GB" smtClean="0"/>
-              <a:t>25/01/2020</a:t>
+              <a:t>26/01/2020</a:t>
             </a:fld>
             <a:endParaRPr lang="en-GB"/>
           </a:p>
@@ -4766,7 +4766,7 @@
           <a:p>
             <a:fld id="{EAE06D73-B70B-4306-BE7B-D5A5B0B0BF64}" type="datetimeFigureOut">
               <a:rPr lang="en-GB" smtClean="0"/>
-              <a:t>25/01/2020</a:t>
+              <a:t>26/01/2020</a:t>
             </a:fld>
             <a:endParaRPr lang="en-GB"/>
           </a:p>
@@ -5063,7 +5063,7 @@
           <a:p>
             <a:fld id="{EAE06D73-B70B-4306-BE7B-D5A5B0B0BF64}" type="datetimeFigureOut">
               <a:rPr lang="en-GB" smtClean="0"/>
-              <a:t>25/01/2020</a:t>
+              <a:t>26/01/2020</a:t>
             </a:fld>
             <a:endParaRPr lang="en-GB"/>
           </a:p>
@@ -5505,7 +5505,7 @@
           <a:p>
             <a:fld id="{EAE06D73-B70B-4306-BE7B-D5A5B0B0BF64}" type="datetimeFigureOut">
               <a:rPr lang="en-GB" smtClean="0"/>
-              <a:t>25/01/2020</a:t>
+              <a:t>26/01/2020</a:t>
             </a:fld>
             <a:endParaRPr lang="en-GB"/>
           </a:p>
@@ -5623,7 +5623,7 @@
           <a:p>
             <a:fld id="{EAE06D73-B70B-4306-BE7B-D5A5B0B0BF64}" type="datetimeFigureOut">
               <a:rPr lang="en-GB" smtClean="0"/>
-              <a:t>25/01/2020</a:t>
+              <a:t>26/01/2020</a:t>
             </a:fld>
             <a:endParaRPr lang="en-GB"/>
           </a:p>
@@ -5718,7 +5718,7 @@
           <a:p>
             <a:fld id="{EAE06D73-B70B-4306-BE7B-D5A5B0B0BF64}" type="datetimeFigureOut">
               <a:rPr lang="en-GB" smtClean="0"/>
-              <a:t>25/01/2020</a:t>
+              <a:t>26/01/2020</a:t>
             </a:fld>
             <a:endParaRPr lang="en-GB"/>
           </a:p>
@@ -6001,7 +6001,7 @@
           <a:p>
             <a:fld id="{EAE06D73-B70B-4306-BE7B-D5A5B0B0BF64}" type="datetimeFigureOut">
               <a:rPr lang="en-GB" smtClean="0"/>
-              <a:t>25/01/2020</a:t>
+              <a:t>26/01/2020</a:t>
             </a:fld>
             <a:endParaRPr lang="en-GB"/>
           </a:p>
@@ -6292,7 +6292,7 @@
           <a:p>
             <a:fld id="{EAE06D73-B70B-4306-BE7B-D5A5B0B0BF64}" type="datetimeFigureOut">
               <a:rPr lang="en-GB" smtClean="0"/>
-              <a:t>25/01/2020</a:t>
+              <a:t>26/01/2020</a:t>
             </a:fld>
             <a:endParaRPr lang="en-GB"/>
           </a:p>
@@ -6822,7 +6822,7 @@
           <a:p>
             <a:fld id="{EAE06D73-B70B-4306-BE7B-D5A5B0B0BF64}" type="datetimeFigureOut">
               <a:rPr lang="en-GB" smtClean="0"/>
-              <a:t>25/01/2020</a:t>
+              <a:t>26/01/2020</a:t>
             </a:fld>
             <a:endParaRPr lang="en-GB"/>
           </a:p>
@@ -7839,7 +7839,7 @@
           </a:ln>
           <a:extLst>
             <a:ext uri="{C572A759-6A51-4108-AA02-DFA0A04FC94B}">
-              <ma14:wrappingTextBoxFlag xmlns:ma14="http://schemas.microsoft.com/office/mac/drawingml/2011/main" xmlns="" val="1"/>
+              <ma14:wrappingTextBoxFlag xmlns="" xmlns:ma14="http://schemas.microsoft.com/office/mac/drawingml/2011/main" val="1"/>
             </a:ext>
           </a:extLst>
         </p:spPr>
@@ -7888,7 +7888,7 @@
           </a:ln>
           <a:extLst>
             <a:ext uri="{C572A759-6A51-4108-AA02-DFA0A04FC94B}">
-              <ma14:wrappingTextBoxFlag xmlns:ma14="http://schemas.microsoft.com/office/mac/drawingml/2011/main" xmlns="" val="1"/>
+              <ma14:wrappingTextBoxFlag xmlns="" xmlns:ma14="http://schemas.microsoft.com/office/mac/drawingml/2011/main" val="1"/>
             </a:ext>
           </a:extLst>
         </p:spPr>
@@ -7937,7 +7937,7 @@
           </a:ln>
           <a:extLst>
             <a:ext uri="{C572A759-6A51-4108-AA02-DFA0A04FC94B}">
-              <ma14:wrappingTextBoxFlag xmlns:ma14="http://schemas.microsoft.com/office/mac/drawingml/2011/main" xmlns="" val="1"/>
+              <ma14:wrappingTextBoxFlag xmlns="" xmlns:ma14="http://schemas.microsoft.com/office/mac/drawingml/2011/main" val="1"/>
             </a:ext>
           </a:extLst>
         </p:spPr>
@@ -7986,7 +7986,7 @@
           </a:ln>
           <a:extLst>
             <a:ext uri="{C572A759-6A51-4108-AA02-DFA0A04FC94B}">
-              <ma14:wrappingTextBoxFlag xmlns:ma14="http://schemas.microsoft.com/office/mac/drawingml/2011/main" xmlns="" val="1"/>
+              <ma14:wrappingTextBoxFlag xmlns="" xmlns:ma14="http://schemas.microsoft.com/office/mac/drawingml/2011/main" val="1"/>
             </a:ext>
           </a:extLst>
         </p:spPr>
@@ -8035,7 +8035,7 @@
           </a:ln>
           <a:extLst>
             <a:ext uri="{C572A759-6A51-4108-AA02-DFA0A04FC94B}">
-              <ma14:wrappingTextBoxFlag xmlns:ma14="http://schemas.microsoft.com/office/mac/drawingml/2011/main" xmlns="" val="1"/>
+              <ma14:wrappingTextBoxFlag xmlns="" xmlns:ma14="http://schemas.microsoft.com/office/mac/drawingml/2011/main" val="1"/>
             </a:ext>
           </a:extLst>
         </p:spPr>
@@ -8096,7 +8096,7 @@
           </a:ln>
           <a:extLst>
             <a:ext uri="{C572A759-6A51-4108-AA02-DFA0A04FC94B}">
-              <ma14:wrappingTextBoxFlag xmlns:ma14="http://schemas.microsoft.com/office/mac/drawingml/2011/main" xmlns="" val="1"/>
+              <ma14:wrappingTextBoxFlag xmlns="" xmlns:ma14="http://schemas.microsoft.com/office/mac/drawingml/2011/main" val="1"/>
             </a:ext>
           </a:extLst>
         </p:spPr>
@@ -8177,7 +8177,7 @@
           </a:ln>
           <a:extLst>
             <a:ext uri="{C572A759-6A51-4108-AA02-DFA0A04FC94B}">
-              <ma14:wrappingTextBoxFlag xmlns:ma14="http://schemas.microsoft.com/office/mac/drawingml/2011/main" xmlns="" val="1"/>
+              <ma14:wrappingTextBoxFlag xmlns="" xmlns:ma14="http://schemas.microsoft.com/office/mac/drawingml/2011/main" val="1"/>
             </a:ext>
           </a:extLst>
         </p:spPr>
@@ -8242,7 +8242,7 @@
           </a:ln>
           <a:extLst>
             <a:ext uri="{C572A759-6A51-4108-AA02-DFA0A04FC94B}">
-              <ma14:wrappingTextBoxFlag xmlns:ma14="http://schemas.microsoft.com/office/mac/drawingml/2011/main" xmlns="" val="1"/>
+              <ma14:wrappingTextBoxFlag xmlns="" xmlns:ma14="http://schemas.microsoft.com/office/mac/drawingml/2011/main" val="1"/>
             </a:ext>
           </a:extLst>
         </p:spPr>
@@ -8729,7 +8729,7 @@
             <a:effectLst/>
             <a:extLst>
               <a:ext uri="{C572A759-6A51-4108-AA02-DFA0A04FC94B}">
-                <ma14:wrappingTextBoxFlag xmlns:ma14="http://schemas.microsoft.com/office/mac/drawingml/2011/main" xmlns="" val="1"/>
+                <ma14:wrappingTextBoxFlag xmlns="" xmlns:ma14="http://schemas.microsoft.com/office/mac/drawingml/2011/main" val="1"/>
               </a:ext>
             </a:extLst>
           </p:spPr>
@@ -8832,7 +8832,7 @@
             <a:effectLst/>
             <a:extLst>
               <a:ext uri="{C572A759-6A51-4108-AA02-DFA0A04FC94B}">
-                <ma14:wrappingTextBoxFlag xmlns:ma14="http://schemas.microsoft.com/office/mac/drawingml/2011/main" xmlns="" val="1"/>
+                <ma14:wrappingTextBoxFlag xmlns="" xmlns:ma14="http://schemas.microsoft.com/office/mac/drawingml/2011/main" val="1"/>
               </a:ext>
             </a:extLst>
           </p:spPr>
@@ -9357,7 +9357,7 @@
             <a:effectLst/>
             <a:extLst>
               <a:ext uri="{C572A759-6A51-4108-AA02-DFA0A04FC94B}">
-                <ma14:wrappingTextBoxFlag xmlns:ma14="http://schemas.microsoft.com/office/mac/drawingml/2011/main" xmlns="" val="1"/>
+                <ma14:wrappingTextBoxFlag xmlns="" xmlns:ma14="http://schemas.microsoft.com/office/mac/drawingml/2011/main" val="1"/>
               </a:ext>
             </a:extLst>
           </p:spPr>
@@ -9460,7 +9460,7 @@
             <a:effectLst/>
             <a:extLst>
               <a:ext uri="{C572A759-6A51-4108-AA02-DFA0A04FC94B}">
-                <ma14:wrappingTextBoxFlag xmlns:ma14="http://schemas.microsoft.com/office/mac/drawingml/2011/main" xmlns="" val="1"/>
+                <ma14:wrappingTextBoxFlag xmlns="" xmlns:ma14="http://schemas.microsoft.com/office/mac/drawingml/2011/main" val="1"/>
               </a:ext>
             </a:extLst>
           </p:spPr>
@@ -9662,7 +9662,7 @@
             <a:effectLst/>
             <a:extLst>
               <a:ext uri="{C572A759-6A51-4108-AA02-DFA0A04FC94B}">
-                <ma14:wrappingTextBoxFlag xmlns:ma14="http://schemas.microsoft.com/office/mac/drawingml/2011/main" xmlns="" val="1"/>
+                <ma14:wrappingTextBoxFlag xmlns="" xmlns:ma14="http://schemas.microsoft.com/office/mac/drawingml/2011/main" val="1"/>
               </a:ext>
             </a:extLst>
           </p:spPr>
@@ -9765,7 +9765,7 @@
             <a:effectLst/>
             <a:extLst>
               <a:ext uri="{C572A759-6A51-4108-AA02-DFA0A04FC94B}">
-                <ma14:wrappingTextBoxFlag xmlns:ma14="http://schemas.microsoft.com/office/mac/drawingml/2011/main" xmlns="" val="1"/>
+                <ma14:wrappingTextBoxFlag xmlns="" xmlns:ma14="http://schemas.microsoft.com/office/mac/drawingml/2011/main" val="1"/>
               </a:ext>
             </a:extLst>
           </p:spPr>
@@ -9967,7 +9967,7 @@
             <a:effectLst/>
             <a:extLst>
               <a:ext uri="{C572A759-6A51-4108-AA02-DFA0A04FC94B}">
-                <ma14:wrappingTextBoxFlag xmlns:ma14="http://schemas.microsoft.com/office/mac/drawingml/2011/main" xmlns="" val="1"/>
+                <ma14:wrappingTextBoxFlag xmlns="" xmlns:ma14="http://schemas.microsoft.com/office/mac/drawingml/2011/main" val="1"/>
               </a:ext>
             </a:extLst>
           </p:spPr>
@@ -10070,7 +10070,7 @@
             <a:effectLst/>
             <a:extLst>
               <a:ext uri="{C572A759-6A51-4108-AA02-DFA0A04FC94B}">
-                <ma14:wrappingTextBoxFlag xmlns:ma14="http://schemas.microsoft.com/office/mac/drawingml/2011/main" xmlns="" val="1"/>
+                <ma14:wrappingTextBoxFlag xmlns="" xmlns:ma14="http://schemas.microsoft.com/office/mac/drawingml/2011/main" val="1"/>
               </a:ext>
             </a:extLst>
           </p:spPr>
@@ -10272,7 +10272,7 @@
             <a:effectLst/>
             <a:extLst>
               <a:ext uri="{C572A759-6A51-4108-AA02-DFA0A04FC94B}">
-                <ma14:wrappingTextBoxFlag xmlns:ma14="http://schemas.microsoft.com/office/mac/drawingml/2011/main" xmlns="" val="1"/>
+                <ma14:wrappingTextBoxFlag xmlns="" xmlns:ma14="http://schemas.microsoft.com/office/mac/drawingml/2011/main" val="1"/>
               </a:ext>
             </a:extLst>
           </p:spPr>
@@ -10375,7 +10375,7 @@
             <a:effectLst/>
             <a:extLst>
               <a:ext uri="{C572A759-6A51-4108-AA02-DFA0A04FC94B}">
-                <ma14:wrappingTextBoxFlag xmlns:ma14="http://schemas.microsoft.com/office/mac/drawingml/2011/main" xmlns="" val="1"/>
+                <ma14:wrappingTextBoxFlag xmlns="" xmlns:ma14="http://schemas.microsoft.com/office/mac/drawingml/2011/main" val="1"/>
               </a:ext>
             </a:extLst>
           </p:spPr>
@@ -10577,7 +10577,7 @@
             <a:effectLst/>
             <a:extLst>
               <a:ext uri="{C572A759-6A51-4108-AA02-DFA0A04FC94B}">
-                <ma14:wrappingTextBoxFlag xmlns:ma14="http://schemas.microsoft.com/office/mac/drawingml/2011/main" xmlns="" val="1"/>
+                <ma14:wrappingTextBoxFlag xmlns="" xmlns:ma14="http://schemas.microsoft.com/office/mac/drawingml/2011/main" val="1"/>
               </a:ext>
             </a:extLst>
           </p:spPr>
@@ -10680,7 +10680,7 @@
             <a:effectLst/>
             <a:extLst>
               <a:ext uri="{C572A759-6A51-4108-AA02-DFA0A04FC94B}">
-                <ma14:wrappingTextBoxFlag xmlns:ma14="http://schemas.microsoft.com/office/mac/drawingml/2011/main" xmlns="" val="1"/>
+                <ma14:wrappingTextBoxFlag xmlns="" xmlns:ma14="http://schemas.microsoft.com/office/mac/drawingml/2011/main" val="1"/>
               </a:ext>
             </a:extLst>
           </p:spPr>
@@ -10882,7 +10882,7 @@
             <a:effectLst/>
             <a:extLst>
               <a:ext uri="{C572A759-6A51-4108-AA02-DFA0A04FC94B}">
-                <ma14:wrappingTextBoxFlag xmlns:ma14="http://schemas.microsoft.com/office/mac/drawingml/2011/main" xmlns="" val="1"/>
+                <ma14:wrappingTextBoxFlag xmlns="" xmlns:ma14="http://schemas.microsoft.com/office/mac/drawingml/2011/main" val="1"/>
               </a:ext>
             </a:extLst>
           </p:spPr>
@@ -10985,7 +10985,7 @@
             <a:effectLst/>
             <a:extLst>
               <a:ext uri="{C572A759-6A51-4108-AA02-DFA0A04FC94B}">
-                <ma14:wrappingTextBoxFlag xmlns:ma14="http://schemas.microsoft.com/office/mac/drawingml/2011/main" xmlns="" val="1"/>
+                <ma14:wrappingTextBoxFlag xmlns="" xmlns:ma14="http://schemas.microsoft.com/office/mac/drawingml/2011/main" val="1"/>
               </a:ext>
             </a:extLst>
           </p:spPr>
@@ -11187,7 +11187,7 @@
             <a:effectLst/>
             <a:extLst>
               <a:ext uri="{C572A759-6A51-4108-AA02-DFA0A04FC94B}">
-                <ma14:wrappingTextBoxFlag xmlns:ma14="http://schemas.microsoft.com/office/mac/drawingml/2011/main" xmlns="" val="1"/>
+                <ma14:wrappingTextBoxFlag xmlns="" xmlns:ma14="http://schemas.microsoft.com/office/mac/drawingml/2011/main" val="1"/>
               </a:ext>
             </a:extLst>
           </p:spPr>
@@ -11290,7 +11290,7 @@
             <a:effectLst/>
             <a:extLst>
               <a:ext uri="{C572A759-6A51-4108-AA02-DFA0A04FC94B}">
-                <ma14:wrappingTextBoxFlag xmlns:ma14="http://schemas.microsoft.com/office/mac/drawingml/2011/main" xmlns="" val="1"/>
+                <ma14:wrappingTextBoxFlag xmlns="" xmlns:ma14="http://schemas.microsoft.com/office/mac/drawingml/2011/main" val="1"/>
               </a:ext>
             </a:extLst>
           </p:spPr>
@@ -12501,7 +12501,7 @@
           </a:ln>
           <a:extLst>
             <a:ext uri="{C572A759-6A51-4108-AA02-DFA0A04FC94B}">
-              <ma14:wrappingTextBoxFlag xmlns:ma14="http://schemas.microsoft.com/office/mac/drawingml/2011/main" xmlns="" val="1"/>
+              <ma14:wrappingTextBoxFlag xmlns="" xmlns:ma14="http://schemas.microsoft.com/office/mac/drawingml/2011/main" val="1"/>
             </a:ext>
           </a:extLst>
         </p:spPr>
@@ -12550,7 +12550,7 @@
           </a:ln>
           <a:extLst>
             <a:ext uri="{C572A759-6A51-4108-AA02-DFA0A04FC94B}">
-              <ma14:wrappingTextBoxFlag xmlns:ma14="http://schemas.microsoft.com/office/mac/drawingml/2011/main" xmlns="" val="1"/>
+              <ma14:wrappingTextBoxFlag xmlns="" xmlns:ma14="http://schemas.microsoft.com/office/mac/drawingml/2011/main" val="1"/>
             </a:ext>
           </a:extLst>
         </p:spPr>
@@ -12599,7 +12599,7 @@
           </a:ln>
           <a:extLst>
             <a:ext uri="{C572A759-6A51-4108-AA02-DFA0A04FC94B}">
-              <ma14:wrappingTextBoxFlag xmlns:ma14="http://schemas.microsoft.com/office/mac/drawingml/2011/main" xmlns="" val="1"/>
+              <ma14:wrappingTextBoxFlag xmlns="" xmlns:ma14="http://schemas.microsoft.com/office/mac/drawingml/2011/main" val="1"/>
             </a:ext>
           </a:extLst>
         </p:spPr>
@@ -12648,7 +12648,7 @@
           </a:ln>
           <a:extLst>
             <a:ext uri="{C572A759-6A51-4108-AA02-DFA0A04FC94B}">
-              <ma14:wrappingTextBoxFlag xmlns:ma14="http://schemas.microsoft.com/office/mac/drawingml/2011/main" xmlns="" val="1"/>
+              <ma14:wrappingTextBoxFlag xmlns="" xmlns:ma14="http://schemas.microsoft.com/office/mac/drawingml/2011/main" val="1"/>
             </a:ext>
           </a:extLst>
         </p:spPr>
@@ -12697,7 +12697,7 @@
           </a:ln>
           <a:extLst>
             <a:ext uri="{C572A759-6A51-4108-AA02-DFA0A04FC94B}">
-              <ma14:wrappingTextBoxFlag xmlns:ma14="http://schemas.microsoft.com/office/mac/drawingml/2011/main" xmlns="" val="1"/>
+              <ma14:wrappingTextBoxFlag xmlns="" xmlns:ma14="http://schemas.microsoft.com/office/mac/drawingml/2011/main" val="1"/>
             </a:ext>
           </a:extLst>
         </p:spPr>
@@ -12758,7 +12758,7 @@
           </a:ln>
           <a:extLst>
             <a:ext uri="{C572A759-6A51-4108-AA02-DFA0A04FC94B}">
-              <ma14:wrappingTextBoxFlag xmlns:ma14="http://schemas.microsoft.com/office/mac/drawingml/2011/main" xmlns="" val="1"/>
+              <ma14:wrappingTextBoxFlag xmlns="" xmlns:ma14="http://schemas.microsoft.com/office/mac/drawingml/2011/main" val="1"/>
             </a:ext>
           </a:extLst>
         </p:spPr>
@@ -12839,7 +12839,7 @@
           </a:ln>
           <a:extLst>
             <a:ext uri="{C572A759-6A51-4108-AA02-DFA0A04FC94B}">
-              <ma14:wrappingTextBoxFlag xmlns:ma14="http://schemas.microsoft.com/office/mac/drawingml/2011/main" xmlns="" val="1"/>
+              <ma14:wrappingTextBoxFlag xmlns="" xmlns:ma14="http://schemas.microsoft.com/office/mac/drawingml/2011/main" val="1"/>
             </a:ext>
           </a:extLst>
         </p:spPr>
@@ -12929,7 +12929,7 @@
           </a:ln>
           <a:extLst>
             <a:ext uri="{C572A759-6A51-4108-AA02-DFA0A04FC94B}">
-              <ma14:wrappingTextBoxFlag xmlns:ma14="http://schemas.microsoft.com/office/mac/drawingml/2011/main" xmlns="" val="1"/>
+              <ma14:wrappingTextBoxFlag xmlns="" xmlns:ma14="http://schemas.microsoft.com/office/mac/drawingml/2011/main" val="1"/>
             </a:ext>
           </a:extLst>
         </p:spPr>
@@ -13291,7 +13291,7 @@
           </a:prstGeom>
           <a:extLst>
             <a:ext uri="{C572A759-6A51-4108-AA02-DFA0A04FC94B}">
-              <ma14:wrappingTextBoxFlag xmlns:lc="http://schemas.openxmlformats.org/drawingml/2006/lockedCanvas" xmlns="" xmlns:ma14="http://schemas.microsoft.com/office/mac/drawingml/2011/main" val="1"/>
+              <ma14:wrappingTextBoxFlag xmlns:ma14="http://schemas.microsoft.com/office/mac/drawingml/2011/main" xmlns="" xmlns:lc="http://schemas.openxmlformats.org/drawingml/2006/lockedCanvas" val="1"/>
             </a:ext>
           </a:extLst>
         </p:spPr>
@@ -15501,6 +15501,12 @@
             <a:r>
               <a:rPr lang="en-GB" dirty="0"/>
               <a:t>Customer changes their requirements deep into the project.</a:t>
+            </a:r>
+          </a:p>
+          <a:p>
+            <a:r>
+              <a:rPr lang="en-GB" dirty="0"/>
+              <a:t>Unrealistic deadlines and project requirements.</a:t>
             </a:r>
           </a:p>
           <a:p>
@@ -16637,18 +16643,18 @@
 </file>
 
 <file path=customXml/item2.xml><?xml version="1.0" encoding="utf-8"?>
-<p:properties xmlns:p="http://schemas.microsoft.com/office/2006/metadata/properties" xmlns:xsi="http://www.w3.org/2001/XMLSchema-instance" xmlns:pc="http://schemas.microsoft.com/office/infopath/2007/PartnerControls">
-  <documentManagement/>
-</p:properties>
-</file>
-
-<file path=customXml/item3.xml><?xml version="1.0" encoding="utf-8"?>
 <?mso-contentType ?>
 <FormTemplates xmlns="http://schemas.microsoft.com/sharepoint/v3/contenttype/forms">
   <Display>DocumentLibraryForm</Display>
   <Edit>DocumentLibraryForm</Edit>
   <New>DocumentLibraryForm</New>
 </FormTemplates>
+</file>
+
+<file path=customXml/item3.xml><?xml version="1.0" encoding="utf-8"?>
+<p:properties xmlns:p="http://schemas.microsoft.com/office/2006/metadata/properties" xmlns:xsi="http://www.w3.org/2001/XMLSchema-instance" xmlns:pc="http://schemas.microsoft.com/office/infopath/2007/PartnerControls">
+  <documentManagement/>
+</p:properties>
 </file>
 
 <file path=customXml/itemProps1.xml><?xml version="1.0" encoding="utf-8"?>
@@ -16670,6 +16676,14 @@
 </file>
 
 <file path=customXml/itemProps2.xml><?xml version="1.0" encoding="utf-8"?>
+<ds:datastoreItem xmlns:ds="http://schemas.openxmlformats.org/officeDocument/2006/customXml" ds:itemID="{0021A068-8B7E-4D1F-BDB0-C47E5B8C5B68}">
+  <ds:schemaRefs>
+    <ds:schemaRef ds:uri="http://schemas.microsoft.com/sharepoint/v3/contenttype/forms"/>
+  </ds:schemaRefs>
+</ds:datastoreItem>
+</file>
+
+<file path=customXml/itemProps3.xml><?xml version="1.0" encoding="utf-8"?>
 <ds:datastoreItem xmlns:ds="http://schemas.openxmlformats.org/officeDocument/2006/customXml" ds:itemID="{0C88B770-0DC0-492D-ABA1-6F4702E26E51}">
   <ds:schemaRefs>
     <ds:schemaRef ds:uri="f896d14b-0ab6-432c-abcb-694ca9572ec9"/>
@@ -16683,12 +16697,4 @@
     <ds:schemaRef ds:uri="http://purl.org/dc/terms/"/>
   </ds:schemaRefs>
 </ds:datastoreItem>
-</file>
-
-<file path=customXml/itemProps3.xml><?xml version="1.0" encoding="utf-8"?>
-<ds:datastoreItem xmlns:ds="http://schemas.openxmlformats.org/officeDocument/2006/customXml" ds:itemID="{0021A068-8B7E-4D1F-BDB0-C47E5B8C5B68}">
-  <ds:schemaRefs>
-    <ds:schemaRef ds:uri="http://schemas.microsoft.com/sharepoint/v3/contenttype/forms"/>
-  </ds:schemaRefs>
-</ds:datastoreItem>
 </file>
</xml_diff>